<commit_message>
pip is now pip3
</commit_message>
<xml_diff>
--- a/Python Level 2/Lesson 6/Session 6.pptx
+++ b/Python Level 2/Lesson 6/Session 6.pptx
@@ -213,7 +213,7 @@
           <a:p>
             <a:fld id="{38109A83-C578-6D43-811B-ED8E6C06081A}" type="datetimeFigureOut">
               <a:rPr lang="en-US" smtClean="0"/>
-              <a:t>6/27/18</a:t>
+              <a:t>10/30/18</a:t>
             </a:fld>
             <a:endParaRPr lang="en-US"/>
           </a:p>
@@ -693,7 +693,7 @@
           <a:p>
             <a:fld id="{A8A589FF-9945-B74F-928C-17548FC6A46A}" type="datetimeFigureOut">
               <a:rPr lang="en-US" smtClean="0"/>
-              <a:t>6/27/18</a:t>
+              <a:t>10/30/18</a:t>
             </a:fld>
             <a:endParaRPr lang="en-US"/>
           </a:p>
@@ -861,7 +861,7 @@
           <a:p>
             <a:fld id="{A8A589FF-9945-B74F-928C-17548FC6A46A}" type="datetimeFigureOut">
               <a:rPr lang="en-US" smtClean="0"/>
-              <a:t>6/27/18</a:t>
+              <a:t>10/30/18</a:t>
             </a:fld>
             <a:endParaRPr lang="en-US"/>
           </a:p>
@@ -1039,7 +1039,7 @@
           <a:p>
             <a:fld id="{A8A589FF-9945-B74F-928C-17548FC6A46A}" type="datetimeFigureOut">
               <a:rPr lang="en-US" smtClean="0"/>
-              <a:t>6/27/18</a:t>
+              <a:t>10/30/18</a:t>
             </a:fld>
             <a:endParaRPr lang="en-US"/>
           </a:p>
@@ -1207,7 +1207,7 @@
           <a:p>
             <a:fld id="{A8A589FF-9945-B74F-928C-17548FC6A46A}" type="datetimeFigureOut">
               <a:rPr lang="en-US" smtClean="0"/>
-              <a:t>6/27/18</a:t>
+              <a:t>10/30/18</a:t>
             </a:fld>
             <a:endParaRPr lang="en-US"/>
           </a:p>
@@ -1452,7 +1452,7 @@
           <a:p>
             <a:fld id="{A8A589FF-9945-B74F-928C-17548FC6A46A}" type="datetimeFigureOut">
               <a:rPr lang="en-US" smtClean="0"/>
-              <a:t>6/27/18</a:t>
+              <a:t>10/30/18</a:t>
             </a:fld>
             <a:endParaRPr lang="en-US"/>
           </a:p>
@@ -1681,7 +1681,7 @@
           <a:p>
             <a:fld id="{A8A589FF-9945-B74F-928C-17548FC6A46A}" type="datetimeFigureOut">
               <a:rPr lang="en-US" smtClean="0"/>
-              <a:t>6/27/18</a:t>
+              <a:t>10/30/18</a:t>
             </a:fld>
             <a:endParaRPr lang="en-US"/>
           </a:p>
@@ -2045,7 +2045,7 @@
           <a:p>
             <a:fld id="{A8A589FF-9945-B74F-928C-17548FC6A46A}" type="datetimeFigureOut">
               <a:rPr lang="en-US" smtClean="0"/>
-              <a:t>6/27/18</a:t>
+              <a:t>10/30/18</a:t>
             </a:fld>
             <a:endParaRPr lang="en-US"/>
           </a:p>
@@ -2162,7 +2162,7 @@
           <a:p>
             <a:fld id="{A8A589FF-9945-B74F-928C-17548FC6A46A}" type="datetimeFigureOut">
               <a:rPr lang="en-US" smtClean="0"/>
-              <a:t>6/27/18</a:t>
+              <a:t>10/30/18</a:t>
             </a:fld>
             <a:endParaRPr lang="en-US"/>
           </a:p>
@@ -2257,7 +2257,7 @@
           <a:p>
             <a:fld id="{A8A589FF-9945-B74F-928C-17548FC6A46A}" type="datetimeFigureOut">
               <a:rPr lang="en-US" smtClean="0"/>
-              <a:t>6/27/18</a:t>
+              <a:t>10/30/18</a:t>
             </a:fld>
             <a:endParaRPr lang="en-US"/>
           </a:p>
@@ -2532,7 +2532,7 @@
           <a:p>
             <a:fld id="{A8A589FF-9945-B74F-928C-17548FC6A46A}" type="datetimeFigureOut">
               <a:rPr lang="en-US" smtClean="0"/>
-              <a:t>6/27/18</a:t>
+              <a:t>10/30/18</a:t>
             </a:fld>
             <a:endParaRPr lang="en-US"/>
           </a:p>
@@ -2784,7 +2784,7 @@
           <a:p>
             <a:fld id="{A8A589FF-9945-B74F-928C-17548FC6A46A}" type="datetimeFigureOut">
               <a:rPr lang="en-US" smtClean="0"/>
-              <a:t>6/27/18</a:t>
+              <a:t>10/30/18</a:t>
             </a:fld>
             <a:endParaRPr lang="en-US"/>
           </a:p>
@@ -2995,7 +2995,7 @@
           <a:p>
             <a:fld id="{A8A589FF-9945-B74F-928C-17548FC6A46A}" type="datetimeFigureOut">
               <a:rPr lang="en-US" smtClean="0"/>
-              <a:t>6/27/18</a:t>
+              <a:t>10/30/18</a:t>
             </a:fld>
             <a:endParaRPr lang="en-US"/>
           </a:p>
@@ -3601,7 +3601,13 @@
       </p:sp>
       <p:pic>
         <p:nvPicPr>
-          <p:cNvPr id="10" name="Content Placeholder 9"/>
+          <p:cNvPr id="7" name="Content Placeholder 6">
+            <a:extLst>
+              <a:ext uri="{FF2B5EF4-FFF2-40B4-BE49-F238E27FC236}">
+                <a16:creationId xmlns:a16="http://schemas.microsoft.com/office/drawing/2014/main" id="{6F08E0E3-E858-C747-8D8A-E9EE14492949}"/>
+              </a:ext>
+            </a:extLst>
+          </p:cNvPr>
           <p:cNvPicPr>
             <a:picLocks noGrp="1" noChangeAspect="1"/>
           </p:cNvPicPr>
@@ -3610,21 +3616,15 @@
           </p:nvPr>
         </p:nvPicPr>
         <p:blipFill>
-          <a:blip r:embed="rId2">
-            <a:extLst>
-              <a:ext uri="{28A0092B-C50C-407E-A947-70E740481C1C}">
-                <a14:useLocalDpi xmlns:a14="http://schemas.microsoft.com/office/drawing/2010/main" val="0"/>
-              </a:ext>
-            </a:extLst>
-          </a:blip>
+          <a:blip r:embed="rId2"/>
           <a:stretch>
             <a:fillRect/>
           </a:stretch>
         </p:blipFill>
         <p:spPr>
           <a:xfrm>
-            <a:off x="2271929" y="1424182"/>
-            <a:ext cx="7648142" cy="4351338"/>
+            <a:off x="838200" y="2180895"/>
+            <a:ext cx="10515600" cy="3640797"/>
           </a:xfrm>
         </p:spPr>
       </p:pic>
@@ -3751,7 +3751,7 @@
                 <a:latin typeface="Consolas" panose="020B0609020204030204" pitchFamily="49" charset="0"/>
                 <a:cs typeface="Consolas" panose="020B0609020204030204" pitchFamily="49" charset="0"/>
               </a:rPr>
-              <a:t>pip install &lt;</a:t>
+              <a:t>pip3 install &lt;</a:t>
             </a:r>
             <a:r>
               <a:rPr lang="en-US" dirty="0" err="1">
@@ -3824,7 +3824,7 @@
                 <a:latin typeface="Consolas" panose="020B0609020204030204" pitchFamily="49" charset="0"/>
                 <a:cs typeface="Consolas" panose="020B0609020204030204" pitchFamily="49" charset="0"/>
               </a:rPr>
-              <a:t> pip install </a:t>
+              <a:t> pip3 install </a:t>
             </a:r>
             <a:r>
               <a:rPr lang="en-US" dirty="0" err="1">
@@ -3981,7 +3981,7 @@
                 <a:latin typeface="Consolas" panose="020B0609020204030204" pitchFamily="49" charset="0"/>
                 <a:cs typeface="Consolas" panose="020B0609020204030204" pitchFamily="49" charset="0"/>
               </a:rPr>
-              <a:t>pip install &lt;</a:t>
+              <a:t>pip3 install &lt;</a:t>
             </a:r>
             <a:r>
               <a:rPr lang="en-US" dirty="0" err="1">
@@ -4171,7 +4171,7 @@
                 <a:ea typeface="Consolas" charset="0"/>
                 <a:cs typeface="Consolas" charset="0"/>
               </a:rPr>
-              <a:t>pip install </a:t>
+              <a:t>pip3 install </a:t>
             </a:r>
             <a:r>
               <a:rPr lang="en-US" dirty="0" err="1">
@@ -4303,7 +4303,7 @@
           <a:p>
             <a:r>
               <a:rPr lang="en-US" dirty="0"/>
-              <a:t>OS X:</a:t>
+              <a:t>MacOS:</a:t>
             </a:r>
           </a:p>
           <a:p>
@@ -4557,8 +4557,12 @@
           </a:p>
           <a:p>
             <a:r>
+              <a:rPr lang="en-US" b="1" dirty="0"/>
+              <a:t>Important: </a:t>
+            </a:r>
+            <a:r>
               <a:rPr lang="en-US" dirty="0"/>
-              <a:t>Python 3 users: You need to install version 0.40.dev1 of </a:t>
+              <a:t>You need to install version 0.40.dev1 of </a:t>
             </a:r>
             <a:r>
               <a:rPr lang="en-US" dirty="0" err="1"/>
@@ -4656,7 +4660,13 @@
       </p:sp>
       <p:pic>
         <p:nvPicPr>
-          <p:cNvPr id="4" name="Content Placeholder 3"/>
+          <p:cNvPr id="8" name="Content Placeholder 7">
+            <a:extLst>
+              <a:ext uri="{FF2B5EF4-FFF2-40B4-BE49-F238E27FC236}">
+                <a16:creationId xmlns:a16="http://schemas.microsoft.com/office/drawing/2014/main" id="{7C22A562-77A7-B942-B98B-31702E00BC7E}"/>
+              </a:ext>
+            </a:extLst>
+          </p:cNvPr>
           <p:cNvPicPr>
             <a:picLocks noGrp="1" noChangeAspect="1"/>
           </p:cNvPicPr>
@@ -4665,21 +4675,15 @@
           </p:nvPr>
         </p:nvPicPr>
         <p:blipFill>
-          <a:blip r:embed="rId2">
-            <a:extLst>
-              <a:ext uri="{28A0092B-C50C-407E-A947-70E740481C1C}">
-                <a14:useLocalDpi xmlns:a14="http://schemas.microsoft.com/office/drawing/2010/main" val="0"/>
-              </a:ext>
-            </a:extLst>
-          </a:blip>
+          <a:blip r:embed="rId2"/>
           <a:stretch>
             <a:fillRect/>
           </a:stretch>
         </p:blipFill>
         <p:spPr>
           <a:xfrm>
-            <a:off x="2339686" y="1825625"/>
-            <a:ext cx="7512628" cy="4351338"/>
+            <a:off x="1534452" y="1690688"/>
+            <a:ext cx="9123095" cy="4351338"/>
           </a:xfrm>
         </p:spPr>
       </p:pic>
@@ -4825,6 +4829,41 @@
           </a:prstGeom>
         </p:spPr>
       </p:pic>
+      <p:sp>
+        <p:nvSpPr>
+          <p:cNvPr id="3" name="TextBox 2">
+            <a:extLst>
+              <a:ext uri="{FF2B5EF4-FFF2-40B4-BE49-F238E27FC236}">
+                <a16:creationId xmlns:a16="http://schemas.microsoft.com/office/drawing/2014/main" id="{48A42F88-ED8F-1F40-9466-0A1F692B5F05}"/>
+              </a:ext>
+            </a:extLst>
+          </p:cNvPr>
+          <p:cNvSpPr txBox="1"/>
+          <p:nvPr/>
+        </p:nvSpPr>
+        <p:spPr>
+          <a:xfrm>
+            <a:off x="1447887" y="5688280"/>
+            <a:ext cx="8134984" cy="369332"/>
+          </a:xfrm>
+          <a:prstGeom prst="rect">
+            <a:avLst/>
+          </a:prstGeom>
+          <a:noFill/>
+        </p:spPr>
+        <p:txBody>
+          <a:bodyPr wrap="none" rtlCol="0">
+            <a:spAutoFit/>
+          </a:bodyPr>
+          <a:lstStyle/>
+          <a:p>
+            <a:r>
+              <a:rPr lang="en-US" dirty="0"/>
+              <a:t>This is not a complete listing. You’ll need to modify your code from the previous slide.</a:t>
+            </a:r>
+          </a:p>
+        </p:txBody>
+      </p:sp>
     </p:spTree>
     <p:extLst>
       <p:ext uri="{BB962C8B-B14F-4D97-AF65-F5344CB8AC3E}">

</xml_diff>

<commit_message>
Making the exercise explicit
</commit_message>
<xml_diff>
--- a/Python Level 2/Lesson 6/Session 6.pptx
+++ b/Python Level 2/Lesson 6/Session 6.pptx
@@ -5,7 +5,7 @@
     <p:sldMasterId id="2147483648" r:id="rId1"/>
   </p:sldMasterIdLst>
   <p:notesMasterIdLst>
-    <p:notesMasterId r:id="rId11"/>
+    <p:notesMasterId r:id="rId12"/>
   </p:notesMasterIdLst>
   <p:sldIdLst>
     <p:sldId id="257" r:id="rId2"/>
@@ -17,6 +17,7 @@
     <p:sldId id="264" r:id="rId8"/>
     <p:sldId id="265" r:id="rId9"/>
     <p:sldId id="266" r:id="rId10"/>
+    <p:sldId id="268" r:id="rId11"/>
   </p:sldIdLst>
   <p:sldSz cx="12192000" cy="6858000"/>
   <p:notesSz cx="6858000" cy="9144000"/>
@@ -3559,6 +3560,193 @@
 </p:sld>
 </file>
 
+<file path=ppt/slides/slide10.xml><?xml version="1.0" encoding="utf-8"?>
+<p:sld xmlns:a="http://schemas.openxmlformats.org/drawingml/2006/main" xmlns:r="http://schemas.openxmlformats.org/officeDocument/2006/relationships" xmlns:p="http://schemas.openxmlformats.org/presentationml/2006/main">
+  <p:cSld>
+    <p:spTree>
+      <p:nvGrpSpPr>
+        <p:cNvPr id="1" name=""/>
+        <p:cNvGrpSpPr/>
+        <p:nvPr/>
+      </p:nvGrpSpPr>
+      <p:grpSpPr>
+        <a:xfrm>
+          <a:off x="0" y="0"/>
+          <a:ext cx="0" cy="0"/>
+          <a:chOff x="0" y="0"/>
+          <a:chExt cx="0" cy="0"/>
+        </a:xfrm>
+      </p:grpSpPr>
+      <p:sp>
+        <p:nvSpPr>
+          <p:cNvPr id="2" name="Title 1">
+            <a:extLst>
+              <a:ext uri="{FF2B5EF4-FFF2-40B4-BE49-F238E27FC236}">
+                <a16:creationId xmlns:a16="http://schemas.microsoft.com/office/drawing/2014/main" id="{70DE82FC-D7DD-F34C-B255-EF534ADAFE0A}"/>
+              </a:ext>
+            </a:extLst>
+          </p:cNvPr>
+          <p:cNvSpPr>
+            <a:spLocks noGrp="1"/>
+          </p:cNvSpPr>
+          <p:nvPr>
+            <p:ph type="title"/>
+          </p:nvPr>
+        </p:nvSpPr>
+        <p:spPr/>
+        <p:txBody>
+          <a:bodyPr/>
+          <a:lstStyle/>
+          <a:p>
+            <a:pPr algn="ctr"/>
+            <a:r>
+              <a:rPr lang="en-US" dirty="0"/>
+              <a:t>Serving up data on the </a:t>
+            </a:r>
+            <a:r>
+              <a:rPr lang="en-US" dirty="0" err="1"/>
+              <a:t>Interwebs</a:t>
+            </a:r>
+            <a:endParaRPr lang="en-US" dirty="0"/>
+          </a:p>
+        </p:txBody>
+      </p:sp>
+      <p:sp>
+        <p:nvSpPr>
+          <p:cNvPr id="3" name="Content Placeholder 2">
+            <a:extLst>
+              <a:ext uri="{FF2B5EF4-FFF2-40B4-BE49-F238E27FC236}">
+                <a16:creationId xmlns:a16="http://schemas.microsoft.com/office/drawing/2014/main" id="{2CCE1493-8739-BA45-ACC2-C3CDFD4CB4F1}"/>
+              </a:ext>
+            </a:extLst>
+          </p:cNvPr>
+          <p:cNvSpPr>
+            <a:spLocks noGrp="1"/>
+          </p:cNvSpPr>
+          <p:nvPr>
+            <p:ph idx="1"/>
+          </p:nvPr>
+        </p:nvSpPr>
+        <p:spPr/>
+        <p:txBody>
+          <a:bodyPr/>
+          <a:lstStyle/>
+          <a:p>
+            <a:r>
+              <a:rPr lang="en-US" dirty="0"/>
+              <a:t>We want to be able to list the restaurants we have data about</a:t>
+            </a:r>
+            <a:br>
+              <a:rPr lang="en-US" dirty="0"/>
+            </a:br>
+            <a:endParaRPr lang="en-US" dirty="0"/>
+          </a:p>
+          <a:p>
+            <a:r>
+              <a:rPr lang="en-US" dirty="0"/>
+              <a:t>Implement the </a:t>
+            </a:r>
+            <a:r>
+              <a:rPr lang="en-US" dirty="0" err="1">
+                <a:latin typeface="Consolas" panose="020B0609020204030204" pitchFamily="49" charset="0"/>
+                <a:cs typeface="Consolas" panose="020B0609020204030204" pitchFamily="49" charset="0"/>
+              </a:rPr>
+              <a:t>ListRestaurants</a:t>
+            </a:r>
+            <a:r>
+              <a:rPr lang="en-US" dirty="0"/>
+              <a:t> method from the previous slide. </a:t>
+            </a:r>
+            <a:br>
+              <a:rPr lang="en-US" dirty="0"/>
+            </a:br>
+            <a:endParaRPr lang="en-US" dirty="0"/>
+          </a:p>
+          <a:p>
+            <a:r>
+              <a:rPr lang="en-US" dirty="0"/>
+              <a:t>You will need </a:t>
+            </a:r>
+            <a:r>
+              <a:rPr lang="en-US" dirty="0" err="1">
+                <a:latin typeface="Consolas" panose="020B0609020204030204" pitchFamily="49" charset="0"/>
+                <a:cs typeface="Consolas" panose="020B0609020204030204" pitchFamily="49" charset="0"/>
+              </a:rPr>
+              <a:t>shared.py</a:t>
+            </a:r>
+            <a:r>
+              <a:rPr lang="en-US" dirty="0">
+                <a:latin typeface="Consolas" panose="020B0609020204030204" pitchFamily="49" charset="0"/>
+                <a:cs typeface="Consolas" panose="020B0609020204030204" pitchFamily="49" charset="0"/>
+              </a:rPr>
+              <a:t> </a:t>
+            </a:r>
+            <a:r>
+              <a:rPr lang="en-US" dirty="0"/>
+              <a:t>from a previous week’s exercises</a:t>
+            </a:r>
+          </a:p>
+          <a:p>
+            <a:pPr lvl="1"/>
+            <a:endParaRPr lang="en-US" dirty="0"/>
+          </a:p>
+          <a:p>
+            <a:pPr marL="457200" lvl="1" indent="0">
+              <a:buNone/>
+            </a:pPr>
+            <a:endParaRPr lang="en-US" dirty="0"/>
+          </a:p>
+        </p:txBody>
+      </p:sp>
+      <p:pic>
+        <p:nvPicPr>
+          <p:cNvPr id="5" name="Picture 4">
+            <a:extLst>
+              <a:ext uri="{FF2B5EF4-FFF2-40B4-BE49-F238E27FC236}">
+                <a16:creationId xmlns:a16="http://schemas.microsoft.com/office/drawing/2014/main" id="{23888C89-854A-3E48-9A1F-A67F4847316D}"/>
+              </a:ext>
+            </a:extLst>
+          </p:cNvPr>
+          <p:cNvPicPr>
+            <a:picLocks noChangeAspect="1"/>
+          </p:cNvPicPr>
+          <p:nvPr/>
+        </p:nvPicPr>
+        <p:blipFill>
+          <a:blip r:embed="rId2">
+            <a:extLst>
+              <a:ext uri="{28A0092B-C50C-407E-A947-70E740481C1C}">
+                <a14:useLocalDpi xmlns:a14="http://schemas.microsoft.com/office/drawing/2010/main" val="0"/>
+              </a:ext>
+            </a:extLst>
+          </a:blip>
+          <a:stretch>
+            <a:fillRect/>
+          </a:stretch>
+        </p:blipFill>
+        <p:spPr>
+          <a:xfrm>
+            <a:off x="9801412" y="4624575"/>
+            <a:ext cx="1552388" cy="1552388"/>
+          </a:xfrm>
+          <a:prstGeom prst="rect">
+            <a:avLst/>
+          </a:prstGeom>
+        </p:spPr>
+      </p:pic>
+    </p:spTree>
+    <p:extLst>
+      <p:ext uri="{BB962C8B-B14F-4D97-AF65-F5344CB8AC3E}">
+        <p14:creationId xmlns:p14="http://schemas.microsoft.com/office/powerpoint/2010/main" val="3514722383"/>
+      </p:ext>
+    </p:extLst>
+  </p:cSld>
+  <p:clrMapOvr>
+    <a:masterClrMapping/>
+  </p:clrMapOvr>
+</p:sld>
+</file>
+
 <file path=ppt/slides/slide2.xml><?xml version="1.0" encoding="utf-8"?>
 <p:sld xmlns:a="http://schemas.openxmlformats.org/drawingml/2006/main" xmlns:r="http://schemas.openxmlformats.org/officeDocument/2006/relationships" xmlns:p="http://schemas.openxmlformats.org/presentationml/2006/main">
   <p:cSld>
@@ -4130,7 +4318,7 @@
             <a:pPr lvl="1"/>
             <a:r>
               <a:rPr lang="en-US" dirty="0"/>
-              <a:t>program A needs version 1 of a module</a:t>
+              <a:t>Program A needs version 1 of a module</a:t>
             </a:r>
           </a:p>
           <a:p>
@@ -4322,7 +4510,7 @@
                 <a:ea typeface="Consolas" charset="0"/>
                 <a:cs typeface="Consolas" charset="0"/>
               </a:rPr>
-              <a:t> lesson7</a:t>
+              <a:t> pythonL2</a:t>
             </a:r>
           </a:p>
           <a:p>
@@ -4333,7 +4521,7 @@
                 <a:ea typeface="Consolas" charset="0"/>
                 <a:cs typeface="Consolas" charset="0"/>
               </a:rPr>
-              <a:t>source lesson7/bin/activate</a:t>
+              <a:t>source pythonL2/bin/activate</a:t>
             </a:r>
           </a:p>
           <a:p>
@@ -4362,7 +4550,7 @@
                 <a:ea typeface="Consolas" charset="0"/>
                 <a:cs typeface="Consolas" charset="0"/>
               </a:rPr>
-              <a:t> lesson7</a:t>
+              <a:t> pythonL2</a:t>
             </a:r>
           </a:p>
           <a:p>
@@ -4373,7 +4561,7 @@
                 <a:ea typeface="Consolas" charset="0"/>
                 <a:cs typeface="Consolas" charset="0"/>
               </a:rPr>
-              <a:t>lesson7\Scripts\activate</a:t>
+              <a:t>pythonL2\Scripts\activate</a:t>
             </a:r>
           </a:p>
           <a:p>

</xml_diff>

<commit_message>
Updated to use new framework - web.py is getting long in the tooth :(
</commit_message>
<xml_diff>
--- a/Python Level 2/Lesson 6/Session 6.pptx
+++ b/Python Level 2/Lesson 6/Session 6.pptx
@@ -214,7 +214,7 @@
           <a:p>
             <a:fld id="{38109A83-C578-6D43-811B-ED8E6C06081A}" type="datetimeFigureOut">
               <a:rPr lang="en-US" smtClean="0"/>
-              <a:t>10/30/18</a:t>
+              <a:t>2/27/19</a:t>
             </a:fld>
             <a:endParaRPr lang="en-US"/>
           </a:p>
@@ -694,7 +694,7 @@
           <a:p>
             <a:fld id="{A8A589FF-9945-B74F-928C-17548FC6A46A}" type="datetimeFigureOut">
               <a:rPr lang="en-US" smtClean="0"/>
-              <a:t>10/30/18</a:t>
+              <a:t>2/27/19</a:t>
             </a:fld>
             <a:endParaRPr lang="en-US"/>
           </a:p>
@@ -862,7 +862,7 @@
           <a:p>
             <a:fld id="{A8A589FF-9945-B74F-928C-17548FC6A46A}" type="datetimeFigureOut">
               <a:rPr lang="en-US" smtClean="0"/>
-              <a:t>10/30/18</a:t>
+              <a:t>2/27/19</a:t>
             </a:fld>
             <a:endParaRPr lang="en-US"/>
           </a:p>
@@ -1040,7 +1040,7 @@
           <a:p>
             <a:fld id="{A8A589FF-9945-B74F-928C-17548FC6A46A}" type="datetimeFigureOut">
               <a:rPr lang="en-US" smtClean="0"/>
-              <a:t>10/30/18</a:t>
+              <a:t>2/27/19</a:t>
             </a:fld>
             <a:endParaRPr lang="en-US"/>
           </a:p>
@@ -1208,7 +1208,7 @@
           <a:p>
             <a:fld id="{A8A589FF-9945-B74F-928C-17548FC6A46A}" type="datetimeFigureOut">
               <a:rPr lang="en-US" smtClean="0"/>
-              <a:t>10/30/18</a:t>
+              <a:t>2/27/19</a:t>
             </a:fld>
             <a:endParaRPr lang="en-US"/>
           </a:p>
@@ -1453,7 +1453,7 @@
           <a:p>
             <a:fld id="{A8A589FF-9945-B74F-928C-17548FC6A46A}" type="datetimeFigureOut">
               <a:rPr lang="en-US" smtClean="0"/>
-              <a:t>10/30/18</a:t>
+              <a:t>2/27/19</a:t>
             </a:fld>
             <a:endParaRPr lang="en-US"/>
           </a:p>
@@ -1682,7 +1682,7 @@
           <a:p>
             <a:fld id="{A8A589FF-9945-B74F-928C-17548FC6A46A}" type="datetimeFigureOut">
               <a:rPr lang="en-US" smtClean="0"/>
-              <a:t>10/30/18</a:t>
+              <a:t>2/27/19</a:t>
             </a:fld>
             <a:endParaRPr lang="en-US"/>
           </a:p>
@@ -2046,7 +2046,7 @@
           <a:p>
             <a:fld id="{A8A589FF-9945-B74F-928C-17548FC6A46A}" type="datetimeFigureOut">
               <a:rPr lang="en-US" smtClean="0"/>
-              <a:t>10/30/18</a:t>
+              <a:t>2/27/19</a:t>
             </a:fld>
             <a:endParaRPr lang="en-US"/>
           </a:p>
@@ -2163,7 +2163,7 @@
           <a:p>
             <a:fld id="{A8A589FF-9945-B74F-928C-17548FC6A46A}" type="datetimeFigureOut">
               <a:rPr lang="en-US" smtClean="0"/>
-              <a:t>10/30/18</a:t>
+              <a:t>2/27/19</a:t>
             </a:fld>
             <a:endParaRPr lang="en-US"/>
           </a:p>
@@ -2258,7 +2258,7 @@
           <a:p>
             <a:fld id="{A8A589FF-9945-B74F-928C-17548FC6A46A}" type="datetimeFigureOut">
               <a:rPr lang="en-US" smtClean="0"/>
-              <a:t>10/30/18</a:t>
+              <a:t>2/27/19</a:t>
             </a:fld>
             <a:endParaRPr lang="en-US"/>
           </a:p>
@@ -2533,7 +2533,7 @@
           <a:p>
             <a:fld id="{A8A589FF-9945-B74F-928C-17548FC6A46A}" type="datetimeFigureOut">
               <a:rPr lang="en-US" smtClean="0"/>
-              <a:t>10/30/18</a:t>
+              <a:t>2/27/19</a:t>
             </a:fld>
             <a:endParaRPr lang="en-US"/>
           </a:p>
@@ -2785,7 +2785,7 @@
           <a:p>
             <a:fld id="{A8A589FF-9945-B74F-928C-17548FC6A46A}" type="datetimeFigureOut">
               <a:rPr lang="en-US" smtClean="0"/>
-              <a:t>10/30/18</a:t>
+              <a:t>2/27/19</a:t>
             </a:fld>
             <a:endParaRPr lang="en-US"/>
           </a:p>
@@ -2996,7 +2996,7 @@
           <a:p>
             <a:fld id="{A8A589FF-9945-B74F-928C-17548FC6A46A}" type="datetimeFigureOut">
               <a:rPr lang="en-US" smtClean="0"/>
-              <a:t>10/30/18</a:t>
+              <a:t>2/27/19</a:t>
             </a:fld>
             <a:endParaRPr lang="en-US"/>
           </a:p>
@@ -3634,7 +3634,7 @@
           <a:p>
             <a:r>
               <a:rPr lang="en-US" dirty="0"/>
-              <a:t>We want to be able to list the restaurants we have data about</a:t>
+              <a:t>We want to be able to list the restaurants we have data about:</a:t>
             </a:r>
             <a:br>
               <a:rPr lang="en-US" dirty="0"/>
@@ -3642,27 +3642,18 @@
             <a:endParaRPr lang="en-US" dirty="0"/>
           </a:p>
           <a:p>
+            <a:pPr lvl="1"/>
             <a:r>
               <a:rPr lang="en-US" dirty="0"/>
-              <a:t>Implement the </a:t>
-            </a:r>
-            <a:r>
-              <a:rPr lang="en-US" dirty="0" err="1">
-                <a:latin typeface="Consolas" panose="020B0609020204030204" pitchFamily="49" charset="0"/>
-                <a:cs typeface="Consolas" panose="020B0609020204030204" pitchFamily="49" charset="0"/>
-              </a:rPr>
-              <a:t>ListRestaurants</a:t>
-            </a:r>
-            <a:r>
-              <a:rPr lang="en-US" dirty="0"/>
-              <a:t> method from the previous slide. </a:t>
-            </a:r>
-            <a:br>
-              <a:rPr lang="en-US" dirty="0"/>
-            </a:br>
+              <a:t>Implement the list of restaurants from the previous slide. </a:t>
+            </a:r>
+          </a:p>
+          <a:p>
+            <a:pPr lvl="1"/>
             <a:endParaRPr lang="en-US" dirty="0"/>
           </a:p>
           <a:p>
+            <a:pPr lvl="1"/>
             <a:r>
               <a:rPr lang="en-US" dirty="0"/>
               <a:t>You will need </a:t>
@@ -3687,14 +3678,16 @@
             </a:r>
           </a:p>
           <a:p>
-            <a:pPr lvl="1"/>
             <a:endParaRPr lang="en-US" dirty="0"/>
           </a:p>
           <a:p>
-            <a:pPr marL="457200" lvl="1" indent="0">
-              <a:buNone/>
-            </a:pPr>
             <a:endParaRPr lang="en-US" dirty="0"/>
+          </a:p>
+          <a:p>
+            <a:r>
+              <a:rPr lang="en-US" dirty="0"/>
+              <a:t>Next week: Dynamic content generation!</a:t>
+            </a:r>
           </a:p>
         </p:txBody>
       </p:sp>
@@ -4510,8 +4503,21 @@
                 <a:ea typeface="Consolas" charset="0"/>
                 <a:cs typeface="Consolas" charset="0"/>
               </a:rPr>
-              <a:t> pythonL2</a:t>
-            </a:r>
+              <a:t> </a:t>
+            </a:r>
+            <a:r>
+              <a:rPr lang="en-US" dirty="0" err="1">
+                <a:latin typeface="Consolas" charset="0"/>
+                <a:ea typeface="Consolas" charset="0"/>
+                <a:cs typeface="Consolas" charset="0"/>
+              </a:rPr>
+              <a:t>bottle_env</a:t>
+            </a:r>
+            <a:endParaRPr lang="en-US" dirty="0">
+              <a:latin typeface="Consolas" charset="0"/>
+              <a:ea typeface="Consolas" charset="0"/>
+              <a:cs typeface="Consolas" charset="0"/>
+            </a:endParaRPr>
           </a:p>
           <a:p>
             <a:pPr lvl="1"/>
@@ -4521,7 +4527,23 @@
                 <a:ea typeface="Consolas" charset="0"/>
                 <a:cs typeface="Consolas" charset="0"/>
               </a:rPr>
-              <a:t>source pythonL2/bin/activate</a:t>
+              <a:t>source </a:t>
+            </a:r>
+            <a:r>
+              <a:rPr lang="en-US" dirty="0" err="1">
+                <a:latin typeface="Consolas" charset="0"/>
+                <a:ea typeface="Consolas" charset="0"/>
+                <a:cs typeface="Consolas" charset="0"/>
+              </a:rPr>
+              <a:t>bottle_env</a:t>
+            </a:r>
+            <a:r>
+              <a:rPr lang="en-US" dirty="0">
+                <a:latin typeface="Consolas" charset="0"/>
+                <a:ea typeface="Consolas" charset="0"/>
+                <a:cs typeface="Consolas" charset="0"/>
+              </a:rPr>
+              <a:t>/bin/activate</a:t>
             </a:r>
           </a:p>
           <a:p>
@@ -4550,18 +4572,39 @@
                 <a:ea typeface="Consolas" charset="0"/>
                 <a:cs typeface="Consolas" charset="0"/>
               </a:rPr>
-              <a:t> pythonL2</a:t>
-            </a:r>
+              <a:t> </a:t>
+            </a:r>
+            <a:r>
+              <a:rPr lang="en-US" dirty="0" err="1">
+                <a:latin typeface="Consolas" charset="0"/>
+                <a:ea typeface="Consolas" charset="0"/>
+                <a:cs typeface="Consolas" charset="0"/>
+              </a:rPr>
+              <a:t>bottle_env</a:t>
+            </a:r>
+            <a:endParaRPr lang="en-US" dirty="0">
+              <a:latin typeface="Consolas" charset="0"/>
+              <a:ea typeface="Consolas" charset="0"/>
+              <a:cs typeface="Consolas" charset="0"/>
+            </a:endParaRPr>
           </a:p>
           <a:p>
             <a:pPr lvl="1"/>
+            <a:r>
+              <a:rPr lang="en-US" dirty="0" err="1">
+                <a:latin typeface="Consolas" charset="0"/>
+                <a:ea typeface="Consolas" charset="0"/>
+                <a:cs typeface="Consolas" charset="0"/>
+              </a:rPr>
+              <a:t>bottle_env</a:t>
+            </a:r>
             <a:r>
               <a:rPr lang="en-US" dirty="0">
                 <a:latin typeface="Consolas" charset="0"/>
                 <a:ea typeface="Consolas" charset="0"/>
                 <a:cs typeface="Consolas" charset="0"/>
               </a:rPr>
-              <a:t>pythonL2\Scripts\activate</a:t>
+              <a:t>\Scripts\activate</a:t>
             </a:r>
           </a:p>
           <a:p>
@@ -4728,34 +4771,18 @@
             <a:pPr lvl="1"/>
             <a:r>
               <a:rPr lang="en-US" dirty="0"/>
-              <a:t>Install the module “</a:t>
-            </a:r>
-            <a:r>
-              <a:rPr lang="en-US" dirty="0" err="1"/>
-              <a:t>web.py</a:t>
-            </a:r>
-            <a:r>
-              <a:rPr lang="en-US" dirty="0"/>
-              <a:t>” (that’s its literal name)</a:t>
+              <a:t>Install the module called </a:t>
+            </a:r>
+            <a:r>
+              <a:rPr lang="en-US" dirty="0">
+                <a:latin typeface="Consolas" panose="020B0609020204030204" pitchFamily="49" charset="0"/>
+                <a:cs typeface="Consolas" panose="020B0609020204030204" pitchFamily="49" charset="0"/>
+              </a:rPr>
+              <a:t>bottle</a:t>
             </a:r>
           </a:p>
           <a:p>
             <a:pPr lvl="1"/>
-            <a:endParaRPr lang="en-US" dirty="0"/>
-          </a:p>
-          <a:p>
-            <a:r>
-              <a:rPr lang="en-US" b="1" dirty="0"/>
-              <a:t>Important: </a:t>
-            </a:r>
-            <a:r>
-              <a:rPr lang="en-US" dirty="0"/>
-              <a:t>You need to install version 0.40.dev1 of </a:t>
-            </a:r>
-            <a:r>
-              <a:rPr lang="en-US" dirty="0" err="1"/>
-              <a:t>web.py</a:t>
-            </a:r>
             <a:endParaRPr lang="en-US" dirty="0"/>
           </a:p>
           <a:p>
@@ -4833,25 +4860,31 @@
             <p:ph type="title"/>
           </p:nvPr>
         </p:nvSpPr>
-        <p:spPr/>
+        <p:spPr>
+          <a:xfrm>
+            <a:off x="838200" y="365125"/>
+            <a:ext cx="10515600" cy="1325563"/>
+          </a:xfrm>
+        </p:spPr>
         <p:txBody>
           <a:bodyPr/>
           <a:lstStyle/>
           <a:p>
             <a:pPr algn="ctr"/>
             <a:r>
-              <a:rPr lang="en-US" dirty="0"/>
+              <a:rPr lang="en-US"/>
               <a:t>Building a web server</a:t>
             </a:r>
+            <a:endParaRPr lang="en-US" dirty="0"/>
           </a:p>
         </p:txBody>
       </p:sp>
       <p:pic>
         <p:nvPicPr>
-          <p:cNvPr id="8" name="Content Placeholder 7">
+          <p:cNvPr id="13" name="Content Placeholder 12">
             <a:extLst>
               <a:ext uri="{FF2B5EF4-FFF2-40B4-BE49-F238E27FC236}">
-                <a16:creationId xmlns:a16="http://schemas.microsoft.com/office/drawing/2014/main" id="{7C22A562-77A7-B942-B98B-31702E00BC7E}"/>
+                <a16:creationId xmlns:a16="http://schemas.microsoft.com/office/drawing/2014/main" id="{9C916331-031C-2F4C-A547-231D0D67A903}"/>
               </a:ext>
             </a:extLst>
           </p:cNvPr>
@@ -4870,8 +4903,8 @@
         </p:blipFill>
         <p:spPr>
           <a:xfrm>
-            <a:off x="1534452" y="1690688"/>
-            <a:ext cx="9123095" cy="4351338"/>
+            <a:off x="1953946" y="1400433"/>
+            <a:ext cx="8284107" cy="4404410"/>
           </a:xfrm>
         </p:spPr>
       </p:pic>
@@ -4960,10 +4993,10 @@
       </p:sp>
       <p:pic>
         <p:nvPicPr>
-          <p:cNvPr id="7" name="Content Placeholder 6">
+          <p:cNvPr id="13" name="Content Placeholder 12">
             <a:extLst>
               <a:ext uri="{FF2B5EF4-FFF2-40B4-BE49-F238E27FC236}">
-                <a16:creationId xmlns:a16="http://schemas.microsoft.com/office/drawing/2014/main" id="{F2E8487D-1F76-E14B-9DBC-EEF5C92C2497}"/>
+                <a16:creationId xmlns:a16="http://schemas.microsoft.com/office/drawing/2014/main" id="{31192308-A3BF-6D42-A5D5-2586A77F69D0}"/>
               </a:ext>
             </a:extLst>
           </p:cNvPr>
@@ -4982,8 +5015,8 @@
         </p:blipFill>
         <p:spPr>
           <a:xfrm>
-            <a:off x="1447887" y="1690688"/>
-            <a:ext cx="9296226" cy="3694906"/>
+            <a:off x="2142587" y="1690688"/>
+            <a:ext cx="7906825" cy="4351338"/>
           </a:xfrm>
         </p:spPr>
       </p:pic>
@@ -5017,41 +5050,6 @@
           </a:prstGeom>
         </p:spPr>
       </p:pic>
-      <p:sp>
-        <p:nvSpPr>
-          <p:cNvPr id="3" name="TextBox 2">
-            <a:extLst>
-              <a:ext uri="{FF2B5EF4-FFF2-40B4-BE49-F238E27FC236}">
-                <a16:creationId xmlns:a16="http://schemas.microsoft.com/office/drawing/2014/main" id="{48A42F88-ED8F-1F40-9466-0A1F692B5F05}"/>
-              </a:ext>
-            </a:extLst>
-          </p:cNvPr>
-          <p:cNvSpPr txBox="1"/>
-          <p:nvPr/>
-        </p:nvSpPr>
-        <p:spPr>
-          <a:xfrm>
-            <a:off x="1447887" y="5688280"/>
-            <a:ext cx="8134984" cy="369332"/>
-          </a:xfrm>
-          <a:prstGeom prst="rect">
-            <a:avLst/>
-          </a:prstGeom>
-          <a:noFill/>
-        </p:spPr>
-        <p:txBody>
-          <a:bodyPr wrap="none" rtlCol="0">
-            <a:spAutoFit/>
-          </a:bodyPr>
-          <a:lstStyle/>
-          <a:p>
-            <a:r>
-              <a:rPr lang="en-US" dirty="0"/>
-              <a:t>This is not a complete listing. You’ll need to modify your code from the previous slide.</a:t>
-            </a:r>
-          </a:p>
-        </p:txBody>
-      </p:sp>
     </p:spTree>
     <p:extLst>
       <p:ext uri="{BB962C8B-B14F-4D97-AF65-F5344CB8AC3E}">

</xml_diff>

<commit_message>
Fix typo / ambiguity in slide
</commit_message>
<xml_diff>
--- a/Python Level 2/Lesson 6/Session 6.pptx
+++ b/Python Level 2/Lesson 6/Session 6.pptx
@@ -4993,10 +4993,10 @@
       </p:sp>
       <p:pic>
         <p:nvPicPr>
-          <p:cNvPr id="13" name="Content Placeholder 12">
+          <p:cNvPr id="7" name="Content Placeholder 6">
             <a:extLst>
               <a:ext uri="{FF2B5EF4-FFF2-40B4-BE49-F238E27FC236}">
-                <a16:creationId xmlns:a16="http://schemas.microsoft.com/office/drawing/2014/main" id="{31192308-A3BF-6D42-A5D5-2586A77F69D0}"/>
+                <a16:creationId xmlns:a16="http://schemas.microsoft.com/office/drawing/2014/main" id="{C56907AF-607E-BE4D-ADA3-3B7738DF85EC}"/>
               </a:ext>
             </a:extLst>
           </p:cNvPr>
@@ -5015,8 +5015,8 @@
         </p:blipFill>
         <p:spPr>
           <a:xfrm>
-            <a:off x="2142587" y="1690688"/>
-            <a:ext cx="7906825" cy="4351338"/>
+            <a:off x="2005070" y="1825625"/>
+            <a:ext cx="8181859" cy="4351338"/>
           </a:xfrm>
         </p:spPr>
       </p:pic>

</xml_diff>